<commit_message>
updates to the wireframe
</commit_message>
<xml_diff>
--- a/WireFrame.pptx
+++ b/WireFrame.pptx
@@ -115,7 +115,7 @@
 <file path=ppt/revisionInfo.xml><?xml version="1.0" encoding="utf-8"?>
 <p1510:revInfo xmlns:a="http://schemas.openxmlformats.org/drawingml/2006/main" xmlns:r="http://schemas.openxmlformats.org/officeDocument/2006/relationships" xmlns:p1510="http://schemas.microsoft.com/office/powerpoint/2015/10/main">
   <p1510:revLst>
-    <p1510:client id="{978EC7A8-7A28-4EB3-A037-217EC8E17497}" v="1" dt="2021-04-15T22:56:19.845"/>
+    <p1510:client id="{04B07F56-9481-41E4-BF06-45F3ACDF5032}" v="5" dt="2021-04-17T17:19:55.991"/>
   </p1510:revLst>
 </p1510:revInfo>
 </file>
@@ -170,6 +170,102 @@
       </pc:sldChg>
     </pc:docChg>
   </pc:docChgLst>
+  <pc:docChgLst>
+    <pc:chgData name="Paul Marceau" userId="8f253cba4905c47c" providerId="LiveId" clId="{04B07F56-9481-41E4-BF06-45F3ACDF5032}"/>
+    <pc:docChg chg="custSel modSld">
+      <pc:chgData name="Paul Marceau" userId="8f253cba4905c47c" providerId="LiveId" clId="{04B07F56-9481-41E4-BF06-45F3ACDF5032}" dt="2021-04-17T17:20:13.121" v="222" actId="1035"/>
+      <pc:docMkLst>
+        <pc:docMk/>
+      </pc:docMkLst>
+      <pc:sldChg chg="addSp delSp modSp mod">
+        <pc:chgData name="Paul Marceau" userId="8f253cba4905c47c" providerId="LiveId" clId="{04B07F56-9481-41E4-BF06-45F3ACDF5032}" dt="2021-04-17T17:20:13.121" v="222" actId="1035"/>
+        <pc:sldMkLst>
+          <pc:docMk/>
+          <pc:sldMk cId="3694480001" sldId="256"/>
+        </pc:sldMkLst>
+        <pc:spChg chg="add mod">
+          <ac:chgData name="Paul Marceau" userId="8f253cba4905c47c" providerId="LiveId" clId="{04B07F56-9481-41E4-BF06-45F3ACDF5032}" dt="2021-04-17T17:15:18.877" v="142" actId="20577"/>
+          <ac:spMkLst>
+            <pc:docMk/>
+            <pc:sldMk cId="3694480001" sldId="256"/>
+            <ac:spMk id="2" creationId="{2A6EB8CC-6F6D-4D50-983F-4048769CD6B3}"/>
+          </ac:spMkLst>
+        </pc:spChg>
+        <pc:spChg chg="mod">
+          <ac:chgData name="Paul Marceau" userId="8f253cba4905c47c" providerId="LiveId" clId="{04B07F56-9481-41E4-BF06-45F3ACDF5032}" dt="2021-04-17T17:19:37.443" v="170" actId="6549"/>
+          <ac:spMkLst>
+            <pc:docMk/>
+            <pc:sldMk cId="3694480001" sldId="256"/>
+            <ac:spMk id="5" creationId="{5C1FB18C-C553-4355-AD78-32B8451C0AB3}"/>
+          </ac:spMkLst>
+        </pc:spChg>
+        <pc:spChg chg="mod">
+          <ac:chgData name="Paul Marceau" userId="8f253cba4905c47c" providerId="LiveId" clId="{04B07F56-9481-41E4-BF06-45F3ACDF5032}" dt="2021-04-17T17:19:02.571" v="166" actId="20577"/>
+          <ac:spMkLst>
+            <pc:docMk/>
+            <pc:sldMk cId="3694480001" sldId="256"/>
+            <ac:spMk id="7" creationId="{B7E7C9D1-0BEC-4FD5-8D24-A6F0C635BE8A}"/>
+          </ac:spMkLst>
+        </pc:spChg>
+        <pc:spChg chg="mod">
+          <ac:chgData name="Paul Marceau" userId="8f253cba4905c47c" providerId="LiveId" clId="{04B07F56-9481-41E4-BF06-45F3ACDF5032}" dt="2021-04-17T17:15:50.134" v="155" actId="20577"/>
+          <ac:spMkLst>
+            <pc:docMk/>
+            <pc:sldMk cId="3694480001" sldId="256"/>
+            <ac:spMk id="8" creationId="{E66C0BC8-F9F9-4999-BD26-2E8C3F0CD168}"/>
+          </ac:spMkLst>
+        </pc:spChg>
+        <pc:spChg chg="mod">
+          <ac:chgData name="Paul Marceau" userId="8f253cba4905c47c" providerId="LiveId" clId="{04B07F56-9481-41E4-BF06-45F3ACDF5032}" dt="2021-04-17T17:20:13.121" v="222" actId="1035"/>
+          <ac:spMkLst>
+            <pc:docMk/>
+            <pc:sldMk cId="3694480001" sldId="256"/>
+            <ac:spMk id="10" creationId="{7E00FCCE-9D65-4EA1-B1BD-50303D5B405D}"/>
+          </ac:spMkLst>
+        </pc:spChg>
+        <pc:spChg chg="add mod">
+          <ac:chgData name="Paul Marceau" userId="8f253cba4905c47c" providerId="LiveId" clId="{04B07F56-9481-41E4-BF06-45F3ACDF5032}" dt="2021-04-17T17:18:41.451" v="157" actId="1076"/>
+          <ac:spMkLst>
+            <pc:docMk/>
+            <pc:sldMk cId="3694480001" sldId="256"/>
+            <ac:spMk id="12" creationId="{DCCCEF1E-5679-414F-AE5B-FC828286AFE0}"/>
+          </ac:spMkLst>
+        </pc:spChg>
+        <pc:spChg chg="add mod">
+          <ac:chgData name="Paul Marceau" userId="8f253cba4905c47c" providerId="LiveId" clId="{04B07F56-9481-41E4-BF06-45F3ACDF5032}" dt="2021-04-17T17:19:08.462" v="167" actId="1076"/>
+          <ac:spMkLst>
+            <pc:docMk/>
+            <pc:sldMk cId="3694480001" sldId="256"/>
+            <ac:spMk id="13" creationId="{B29B417A-7C0C-4920-B6A0-41B806DF2B80}"/>
+          </ac:spMkLst>
+        </pc:spChg>
+        <pc:spChg chg="add mod">
+          <ac:chgData name="Paul Marceau" userId="8f253cba4905c47c" providerId="LiveId" clId="{04B07F56-9481-41E4-BF06-45F3ACDF5032}" dt="2021-04-17T17:19:14.806" v="169" actId="1076"/>
+          <ac:spMkLst>
+            <pc:docMk/>
+            <pc:sldMk cId="3694480001" sldId="256"/>
+            <ac:spMk id="14" creationId="{B2513671-08C7-4D4A-B5ED-61B68D4B2C04}"/>
+          </ac:spMkLst>
+        </pc:spChg>
+        <pc:spChg chg="add del mod">
+          <ac:chgData name="Paul Marceau" userId="8f253cba4905c47c" providerId="LiveId" clId="{04B07F56-9481-41E4-BF06-45F3ACDF5032}" dt="2021-04-17T17:19:49.211" v="193" actId="478"/>
+          <ac:spMkLst>
+            <pc:docMk/>
+            <pc:sldMk cId="3694480001" sldId="256"/>
+            <ac:spMk id="15" creationId="{300CC2D6-2A77-45CC-9289-EA111B119256}"/>
+          </ac:spMkLst>
+        </pc:spChg>
+        <pc:spChg chg="add mod">
+          <ac:chgData name="Paul Marceau" userId="8f253cba4905c47c" providerId="LiveId" clId="{04B07F56-9481-41E4-BF06-45F3ACDF5032}" dt="2021-04-17T17:20:05.490" v="201" actId="20577"/>
+          <ac:spMkLst>
+            <pc:docMk/>
+            <pc:sldMk cId="3694480001" sldId="256"/>
+            <ac:spMk id="16" creationId="{B6324DE3-E673-40D7-8D0D-03C260CAAFAE}"/>
+          </ac:spMkLst>
+        </pc:spChg>
+      </pc:sldChg>
+    </pc:docChg>
+  </pc:docChgLst>
 </pc:chgInfo>
 </file>
 
@@ -320,7 +416,7 @@
           <a:p>
             <a:fld id="{2813D5B7-562C-4A38-A2A0-7C53BB6E7588}" type="datetimeFigureOut">
               <a:rPr lang="en-US" smtClean="0"/>
-              <a:t>4/15/2021</a:t>
+              <a:t>4/17/2021</a:t>
             </a:fld>
             <a:endParaRPr lang="en-US"/>
           </a:p>
@@ -518,7 +614,7 @@
           <a:p>
             <a:fld id="{2813D5B7-562C-4A38-A2A0-7C53BB6E7588}" type="datetimeFigureOut">
               <a:rPr lang="en-US" smtClean="0"/>
-              <a:t>4/15/2021</a:t>
+              <a:t>4/17/2021</a:t>
             </a:fld>
             <a:endParaRPr lang="en-US"/>
           </a:p>
@@ -726,7 +822,7 @@
           <a:p>
             <a:fld id="{2813D5B7-562C-4A38-A2A0-7C53BB6E7588}" type="datetimeFigureOut">
               <a:rPr lang="en-US" smtClean="0"/>
-              <a:t>4/15/2021</a:t>
+              <a:t>4/17/2021</a:t>
             </a:fld>
             <a:endParaRPr lang="en-US"/>
           </a:p>
@@ -924,7 +1020,7 @@
           <a:p>
             <a:fld id="{2813D5B7-562C-4A38-A2A0-7C53BB6E7588}" type="datetimeFigureOut">
               <a:rPr lang="en-US" smtClean="0"/>
-              <a:t>4/15/2021</a:t>
+              <a:t>4/17/2021</a:t>
             </a:fld>
             <a:endParaRPr lang="en-US"/>
           </a:p>
@@ -1199,7 +1295,7 @@
           <a:p>
             <a:fld id="{2813D5B7-562C-4A38-A2A0-7C53BB6E7588}" type="datetimeFigureOut">
               <a:rPr lang="en-US" smtClean="0"/>
-              <a:t>4/15/2021</a:t>
+              <a:t>4/17/2021</a:t>
             </a:fld>
             <a:endParaRPr lang="en-US"/>
           </a:p>
@@ -1464,7 +1560,7 @@
           <a:p>
             <a:fld id="{2813D5B7-562C-4A38-A2A0-7C53BB6E7588}" type="datetimeFigureOut">
               <a:rPr lang="en-US" smtClean="0"/>
-              <a:t>4/15/2021</a:t>
+              <a:t>4/17/2021</a:t>
             </a:fld>
             <a:endParaRPr lang="en-US"/>
           </a:p>
@@ -1876,7 +1972,7 @@
           <a:p>
             <a:fld id="{2813D5B7-562C-4A38-A2A0-7C53BB6E7588}" type="datetimeFigureOut">
               <a:rPr lang="en-US" smtClean="0"/>
-              <a:t>4/15/2021</a:t>
+              <a:t>4/17/2021</a:t>
             </a:fld>
             <a:endParaRPr lang="en-US"/>
           </a:p>
@@ -2017,7 +2113,7 @@
           <a:p>
             <a:fld id="{2813D5B7-562C-4A38-A2A0-7C53BB6E7588}" type="datetimeFigureOut">
               <a:rPr lang="en-US" smtClean="0"/>
-              <a:t>4/15/2021</a:t>
+              <a:t>4/17/2021</a:t>
             </a:fld>
             <a:endParaRPr lang="en-US"/>
           </a:p>
@@ -2130,7 +2226,7 @@
           <a:p>
             <a:fld id="{2813D5B7-562C-4A38-A2A0-7C53BB6E7588}" type="datetimeFigureOut">
               <a:rPr lang="en-US" smtClean="0"/>
-              <a:t>4/15/2021</a:t>
+              <a:t>4/17/2021</a:t>
             </a:fld>
             <a:endParaRPr lang="en-US"/>
           </a:p>
@@ -2441,7 +2537,7 @@
           <a:p>
             <a:fld id="{2813D5B7-562C-4A38-A2A0-7C53BB6E7588}" type="datetimeFigureOut">
               <a:rPr lang="en-US" smtClean="0"/>
-              <a:t>4/15/2021</a:t>
+              <a:t>4/17/2021</a:t>
             </a:fld>
             <a:endParaRPr lang="en-US"/>
           </a:p>
@@ -2729,7 +2825,7 @@
           <a:p>
             <a:fld id="{2813D5B7-562C-4A38-A2A0-7C53BB6E7588}" type="datetimeFigureOut">
               <a:rPr lang="en-US" smtClean="0"/>
-              <a:t>4/15/2021</a:t>
+              <a:t>4/17/2021</a:t>
             </a:fld>
             <a:endParaRPr lang="en-US"/>
           </a:p>
@@ -2970,7 +3066,7 @@
           <a:p>
             <a:fld id="{2813D5B7-562C-4A38-A2A0-7C53BB6E7588}" type="datetimeFigureOut">
               <a:rPr lang="en-US" smtClean="0"/>
-              <a:t>4/15/2021</a:t>
+              <a:t>4/17/2021</a:t>
             </a:fld>
             <a:endParaRPr lang="en-US"/>
           </a:p>
@@ -3478,17 +3574,7 @@
           <a:lstStyle/>
           <a:p>
             <a:pPr algn="ctr"/>
-            <a:r>
-              <a:rPr lang="en-US" dirty="0"/>
-              <a:t>Search parameters</a:t>
-            </a:r>
-          </a:p>
-          <a:p>
-            <a:pPr algn="ctr"/>
-            <a:r>
-              <a:rPr lang="en-US" dirty="0"/>
-              <a:t>And submit button</a:t>
-            </a:r>
+            <a:endParaRPr lang="en-US" dirty="0"/>
           </a:p>
         </p:txBody>
       </p:sp>
@@ -3555,7 +3641,7 @@
         </p:nvSpPr>
         <p:spPr>
           <a:xfrm>
-            <a:off x="3009207" y="765110"/>
+            <a:off x="3009208" y="765110"/>
             <a:ext cx="4339242" cy="6092890"/>
           </a:xfrm>
           <a:prstGeom prst="rect">
@@ -3581,13 +3667,6 @@
         <p:txBody>
           <a:bodyPr rtlCol="0" anchor="ctr"/>
           <a:lstStyle/>
-          <a:p>
-            <a:pPr algn="ctr"/>
-            <a:r>
-              <a:rPr lang="en-US" dirty="0"/>
-              <a:t>List results</a:t>
-            </a:r>
-          </a:p>
           <a:p>
             <a:pPr algn="ctr"/>
             <a:endParaRPr lang="en-US" dirty="0"/>
@@ -3642,7 +3721,7 @@
             <a:pPr algn="ctr"/>
             <a:r>
               <a:rPr lang="en-US" dirty="0"/>
-              <a:t>Cuisine - INPUT</a:t>
+              <a:t>Price Range - INPUT</a:t>
             </a:r>
           </a:p>
         </p:txBody>
@@ -3710,7 +3789,7 @@
         </p:nvSpPr>
         <p:spPr>
           <a:xfrm>
-            <a:off x="166251" y="2634792"/>
+            <a:off x="174564" y="3067048"/>
             <a:ext cx="2277687" cy="506737"/>
           </a:xfrm>
           <a:prstGeom prst="rect">
@@ -3790,6 +3869,343 @@
             <a:r>
               <a:rPr lang="en-US" dirty="0"/>
               <a:t>Near Me - BTN</a:t>
+            </a:r>
+          </a:p>
+        </p:txBody>
+      </p:sp>
+      <p:sp>
+        <p:nvSpPr>
+          <p:cNvPr id="2" name="Rectangle 1">
+            <a:extLst>
+              <a:ext uri="{FF2B5EF4-FFF2-40B4-BE49-F238E27FC236}">
+                <a16:creationId xmlns:a16="http://schemas.microsoft.com/office/drawing/2014/main" id="{2A6EB8CC-6F6D-4D50-983F-4048769CD6B3}"/>
+              </a:ext>
+            </a:extLst>
+          </p:cNvPr>
+          <p:cNvSpPr/>
+          <p:nvPr/>
+        </p:nvSpPr>
+        <p:spPr>
+          <a:xfrm>
+            <a:off x="3092335" y="872836"/>
+            <a:ext cx="4139738" cy="1239614"/>
+          </a:xfrm>
+          <a:prstGeom prst="rect">
+            <a:avLst/>
+          </a:prstGeom>
+        </p:spPr>
+        <p:style>
+          <a:lnRef idx="2">
+            <a:schemeClr val="accent1">
+              <a:shade val="50000"/>
+            </a:schemeClr>
+          </a:lnRef>
+          <a:fillRef idx="1">
+            <a:schemeClr val="accent1"/>
+          </a:fillRef>
+          <a:effectRef idx="0">
+            <a:schemeClr val="accent1"/>
+          </a:effectRef>
+          <a:fontRef idx="minor">
+            <a:schemeClr val="lt1"/>
+          </a:fontRef>
+        </p:style>
+        <p:txBody>
+          <a:bodyPr rtlCol="0" anchor="ctr"/>
+          <a:lstStyle/>
+          <a:p>
+            <a:r>
+              <a:rPr lang="en-US" sz="1200" dirty="0"/>
+              <a:t>Name: The Cooper Door</a:t>
+            </a:r>
+          </a:p>
+          <a:p>
+            <a:r>
+              <a:rPr lang="en-US" sz="1200" dirty="0"/>
+              <a:t>Address: 1234 Broad St, Salem, NH 03079</a:t>
+            </a:r>
+          </a:p>
+          <a:p>
+            <a:r>
+              <a:rPr lang="en-US" sz="1200" dirty="0"/>
+              <a:t>Price: $$$$</a:t>
+            </a:r>
+          </a:p>
+          <a:p>
+            <a:r>
+              <a:rPr lang="en-US" sz="1200" dirty="0"/>
+              <a:t>Rating: 4.6</a:t>
+            </a:r>
+          </a:p>
+          <a:p>
+            <a:r>
+              <a:rPr lang="en-US" sz="1200" dirty="0"/>
+              <a:t>Open Now: Yes</a:t>
+            </a:r>
+          </a:p>
+        </p:txBody>
+      </p:sp>
+      <p:sp>
+        <p:nvSpPr>
+          <p:cNvPr id="12" name="Rectangle 11">
+            <a:extLst>
+              <a:ext uri="{FF2B5EF4-FFF2-40B4-BE49-F238E27FC236}">
+                <a16:creationId xmlns:a16="http://schemas.microsoft.com/office/drawing/2014/main" id="{DCCCEF1E-5679-414F-AE5B-FC828286AFE0}"/>
+              </a:ext>
+            </a:extLst>
+          </p:cNvPr>
+          <p:cNvSpPr/>
+          <p:nvPr/>
+        </p:nvSpPr>
+        <p:spPr>
+          <a:xfrm>
+            <a:off x="3108960" y="2204568"/>
+            <a:ext cx="4139738" cy="1239614"/>
+          </a:xfrm>
+          <a:prstGeom prst="rect">
+            <a:avLst/>
+          </a:prstGeom>
+        </p:spPr>
+        <p:style>
+          <a:lnRef idx="2">
+            <a:schemeClr val="accent1">
+              <a:shade val="50000"/>
+            </a:schemeClr>
+          </a:lnRef>
+          <a:fillRef idx="1">
+            <a:schemeClr val="accent1"/>
+          </a:fillRef>
+          <a:effectRef idx="0">
+            <a:schemeClr val="accent1"/>
+          </a:effectRef>
+          <a:fontRef idx="minor">
+            <a:schemeClr val="lt1"/>
+          </a:fontRef>
+        </p:style>
+        <p:txBody>
+          <a:bodyPr rtlCol="0" anchor="ctr"/>
+          <a:lstStyle/>
+          <a:p>
+            <a:r>
+              <a:rPr lang="en-US" sz="1200" dirty="0"/>
+              <a:t>Name: The Cooper Door</a:t>
+            </a:r>
+          </a:p>
+          <a:p>
+            <a:r>
+              <a:rPr lang="en-US" sz="1200" dirty="0"/>
+              <a:t>Address: 1234 Broad St, Salem, NH 03079</a:t>
+            </a:r>
+          </a:p>
+          <a:p>
+            <a:r>
+              <a:rPr lang="en-US" sz="1200" dirty="0"/>
+              <a:t>Price: $$$$</a:t>
+            </a:r>
+          </a:p>
+          <a:p>
+            <a:r>
+              <a:rPr lang="en-US" sz="1200" dirty="0"/>
+              <a:t>Rating: 4.6</a:t>
+            </a:r>
+          </a:p>
+          <a:p>
+            <a:r>
+              <a:rPr lang="en-US" sz="1200" dirty="0"/>
+              <a:t>Open Now: Yes</a:t>
+            </a:r>
+          </a:p>
+        </p:txBody>
+      </p:sp>
+      <p:sp>
+        <p:nvSpPr>
+          <p:cNvPr id="13" name="Rectangle 12">
+            <a:extLst>
+              <a:ext uri="{FF2B5EF4-FFF2-40B4-BE49-F238E27FC236}">
+                <a16:creationId xmlns:a16="http://schemas.microsoft.com/office/drawing/2014/main" id="{B29B417A-7C0C-4920-B6A0-41B806DF2B80}"/>
+              </a:ext>
+            </a:extLst>
+          </p:cNvPr>
+          <p:cNvSpPr/>
+          <p:nvPr/>
+        </p:nvSpPr>
+        <p:spPr>
+          <a:xfrm>
+            <a:off x="3092335" y="3551908"/>
+            <a:ext cx="4139738" cy="1239614"/>
+          </a:xfrm>
+          <a:prstGeom prst="rect">
+            <a:avLst/>
+          </a:prstGeom>
+        </p:spPr>
+        <p:style>
+          <a:lnRef idx="2">
+            <a:schemeClr val="accent1">
+              <a:shade val="50000"/>
+            </a:schemeClr>
+          </a:lnRef>
+          <a:fillRef idx="1">
+            <a:schemeClr val="accent1"/>
+          </a:fillRef>
+          <a:effectRef idx="0">
+            <a:schemeClr val="accent1"/>
+          </a:effectRef>
+          <a:fontRef idx="minor">
+            <a:schemeClr val="lt1"/>
+          </a:fontRef>
+        </p:style>
+        <p:txBody>
+          <a:bodyPr rtlCol="0" anchor="ctr"/>
+          <a:lstStyle/>
+          <a:p>
+            <a:r>
+              <a:rPr lang="en-US" sz="1200" dirty="0"/>
+              <a:t>Name: The Cooper Door</a:t>
+            </a:r>
+          </a:p>
+          <a:p>
+            <a:r>
+              <a:rPr lang="en-US" sz="1200" dirty="0"/>
+              <a:t>Address: 1234 Broad St, Salem, NH 03079</a:t>
+            </a:r>
+          </a:p>
+          <a:p>
+            <a:r>
+              <a:rPr lang="en-US" sz="1200" dirty="0"/>
+              <a:t>Price: $$$$</a:t>
+            </a:r>
+          </a:p>
+          <a:p>
+            <a:r>
+              <a:rPr lang="en-US" sz="1200" dirty="0"/>
+              <a:t>Rating: 4.6</a:t>
+            </a:r>
+          </a:p>
+          <a:p>
+            <a:r>
+              <a:rPr lang="en-US" sz="1200" dirty="0"/>
+              <a:t>Open Now: Yes</a:t>
+            </a:r>
+          </a:p>
+        </p:txBody>
+      </p:sp>
+      <p:sp>
+        <p:nvSpPr>
+          <p:cNvPr id="14" name="Rectangle 13">
+            <a:extLst>
+              <a:ext uri="{FF2B5EF4-FFF2-40B4-BE49-F238E27FC236}">
+                <a16:creationId xmlns:a16="http://schemas.microsoft.com/office/drawing/2014/main" id="{B2513671-08C7-4D4A-B5ED-61B68D4B2C04}"/>
+              </a:ext>
+            </a:extLst>
+          </p:cNvPr>
+          <p:cNvSpPr/>
+          <p:nvPr/>
+        </p:nvSpPr>
+        <p:spPr>
+          <a:xfrm>
+            <a:off x="3108960" y="4873886"/>
+            <a:ext cx="4139738" cy="1239614"/>
+          </a:xfrm>
+          <a:prstGeom prst="rect">
+            <a:avLst/>
+          </a:prstGeom>
+        </p:spPr>
+        <p:style>
+          <a:lnRef idx="2">
+            <a:schemeClr val="accent1">
+              <a:shade val="50000"/>
+            </a:schemeClr>
+          </a:lnRef>
+          <a:fillRef idx="1">
+            <a:schemeClr val="accent1"/>
+          </a:fillRef>
+          <a:effectRef idx="0">
+            <a:schemeClr val="accent1"/>
+          </a:effectRef>
+          <a:fontRef idx="minor">
+            <a:schemeClr val="lt1"/>
+          </a:fontRef>
+        </p:style>
+        <p:txBody>
+          <a:bodyPr rtlCol="0" anchor="ctr"/>
+          <a:lstStyle/>
+          <a:p>
+            <a:r>
+              <a:rPr lang="en-US" sz="1200" dirty="0"/>
+              <a:t>Name: The Cooper Door</a:t>
+            </a:r>
+          </a:p>
+          <a:p>
+            <a:r>
+              <a:rPr lang="en-US" sz="1200" dirty="0"/>
+              <a:t>Address: 1234 Broad St, Salem, NH 03079</a:t>
+            </a:r>
+          </a:p>
+          <a:p>
+            <a:r>
+              <a:rPr lang="en-US" sz="1200" dirty="0"/>
+              <a:t>Price: $$$$</a:t>
+            </a:r>
+          </a:p>
+          <a:p>
+            <a:r>
+              <a:rPr lang="en-US" sz="1200" dirty="0"/>
+              <a:t>Rating: 4.6</a:t>
+            </a:r>
+          </a:p>
+          <a:p>
+            <a:r>
+              <a:rPr lang="en-US" sz="1200" dirty="0"/>
+              <a:t>Open Now: Yes</a:t>
+            </a:r>
+          </a:p>
+        </p:txBody>
+      </p:sp>
+      <p:sp>
+        <p:nvSpPr>
+          <p:cNvPr id="16" name="Rectangle 15">
+            <a:extLst>
+              <a:ext uri="{FF2B5EF4-FFF2-40B4-BE49-F238E27FC236}">
+                <a16:creationId xmlns:a16="http://schemas.microsoft.com/office/drawing/2014/main" id="{B6324DE3-E673-40D7-8D0D-03C260CAAFAE}"/>
+              </a:ext>
+            </a:extLst>
+          </p:cNvPr>
+          <p:cNvSpPr/>
+          <p:nvPr/>
+        </p:nvSpPr>
+        <p:spPr>
+          <a:xfrm>
+            <a:off x="182873" y="2589245"/>
+            <a:ext cx="2277687" cy="365760"/>
+          </a:xfrm>
+          <a:prstGeom prst="rect">
+            <a:avLst/>
+          </a:prstGeom>
+        </p:spPr>
+        <p:style>
+          <a:lnRef idx="2">
+            <a:schemeClr val="accent1">
+              <a:shade val="50000"/>
+            </a:schemeClr>
+          </a:lnRef>
+          <a:fillRef idx="1">
+            <a:schemeClr val="accent1"/>
+          </a:fillRef>
+          <a:effectRef idx="0">
+            <a:schemeClr val="accent1"/>
+          </a:effectRef>
+          <a:fontRef idx="minor">
+            <a:schemeClr val="lt1"/>
+          </a:fontRef>
+        </p:style>
+        <p:txBody>
+          <a:bodyPr rtlCol="0" anchor="ctr"/>
+          <a:lstStyle/>
+          <a:p>
+            <a:pPr algn="ctr"/>
+            <a:r>
+              <a:rPr lang="en-US" dirty="0"/>
+              <a:t>Rating Range - INPUT</a:t>
             </a:r>
           </a:p>
         </p:txBody>

</xml_diff>